<commit_message>
Final presentation for milestone 1
</commit_message>
<xml_diff>
--- a/Milestone 1.pptx
+++ b/Milestone 1.pptx
@@ -12,8 +12,7 @@
     <p:sldId id="264" r:id="rId6"/>
     <p:sldId id="261" r:id="rId7"/>
     <p:sldId id="263" r:id="rId8"/>
-    <p:sldId id="260" r:id="rId9"/>
-    <p:sldId id="258" r:id="rId10"/>
+    <p:sldId id="258" r:id="rId9"/>
   </p:sldIdLst>
   <p:sldSz cx="12192000" cy="6858000"/>
   <p:notesSz cx="6858000" cy="9144000"/>
@@ -1430,7 +1429,7 @@
               <a:pPr>
                 <a:defRPr/>
               </a:pPr>
-              <a:t>2019-10-01</a:t>
+              <a:t>2019-10-02</a:t>
             </a:fld>
             <a:endParaRPr lang="en-CA"/>
           </a:p>
@@ -1665,7 +1664,7 @@
               <a:pPr>
                 <a:defRPr/>
               </a:pPr>
-              <a:t>2019-10-01</a:t>
+              <a:t>2019-10-02</a:t>
             </a:fld>
             <a:endParaRPr lang="en-CA"/>
           </a:p>
@@ -1888,7 +1887,7 @@
               <a:pPr>
                 <a:defRPr/>
               </a:pPr>
-              <a:t>2019-10-01</a:t>
+              <a:t>2019-10-02</a:t>
             </a:fld>
             <a:endParaRPr lang="en-CA"/>
           </a:p>
@@ -2101,7 +2100,7 @@
               <a:pPr>
                 <a:defRPr/>
               </a:pPr>
-              <a:t>2019-10-01</a:t>
+              <a:t>2019-10-02</a:t>
             </a:fld>
             <a:endParaRPr lang="en-CA"/>
           </a:p>
@@ -3370,7 +3369,7 @@
               <a:pPr>
                 <a:defRPr/>
               </a:pPr>
-              <a:t>2019-10-01</a:t>
+              <a:t>2019-10-02</a:t>
             </a:fld>
             <a:endParaRPr lang="en-CA"/>
           </a:p>
@@ -3662,7 +3661,7 @@
               <a:pPr>
                 <a:defRPr/>
               </a:pPr>
-              <a:t>2019-10-01</a:t>
+              <a:t>2019-10-02</a:t>
             </a:fld>
             <a:endParaRPr lang="en-CA"/>
           </a:p>
@@ -4089,7 +4088,7 @@
               <a:pPr>
                 <a:defRPr/>
               </a:pPr>
-              <a:t>2019-10-01</a:t>
+              <a:t>2019-10-02</a:t>
             </a:fld>
             <a:endParaRPr lang="en-CA"/>
           </a:p>
@@ -4251,7 +4250,7 @@
               <a:pPr>
                 <a:defRPr/>
               </a:pPr>
-              <a:t>2019-10-01</a:t>
+              <a:t>2019-10-02</a:t>
             </a:fld>
             <a:endParaRPr lang="en-CA"/>
           </a:p>
@@ -4391,7 +4390,7 @@
               <a:pPr>
                 <a:defRPr/>
               </a:pPr>
-              <a:t>2019-10-01</a:t>
+              <a:t>2019-10-02</a:t>
             </a:fld>
             <a:endParaRPr lang="en-CA"/>
           </a:p>
@@ -5245,7 +5244,7 @@
               <a:pPr>
                 <a:defRPr/>
               </a:pPr>
-              <a:t>2019-10-01</a:t>
+              <a:t>2019-10-02</a:t>
             </a:fld>
             <a:endParaRPr lang="en-CA"/>
           </a:p>
@@ -6092,7 +6091,7 @@
               <a:pPr>
                 <a:defRPr/>
               </a:pPr>
-              <a:t>2019-10-01</a:t>
+              <a:t>2019-10-02</a:t>
             </a:fld>
             <a:endParaRPr lang="en-CA"/>
           </a:p>
@@ -6402,7 +6401,7 @@
               <a:pPr>
                 <a:defRPr/>
               </a:pPr>
-              <a:t>2019-10-01</a:t>
+              <a:t>2019-10-02</a:t>
             </a:fld>
             <a:endParaRPr lang="en-CA"/>
           </a:p>
@@ -8787,96 +8786,6 @@
       </p:grpSpPr>
       <p:sp>
         <p:nvSpPr>
-          <p:cNvPr id="8194" name="Title 1">
-            <a:extLst>
-              <a:ext uri="{FF2B5EF4-FFF2-40B4-BE49-F238E27FC236}">
-                <a16:creationId xmlns:a16="http://schemas.microsoft.com/office/drawing/2014/main" id="{F331A84A-F54D-438C-96AE-A16998EAF414}"/>
-              </a:ext>
-            </a:extLst>
-          </p:cNvPr>
-          <p:cNvSpPr>
-            <a:spLocks noGrp="1" noChangeArrowheads="1"/>
-          </p:cNvSpPr>
-          <p:nvPr>
-            <p:ph type="title"/>
-          </p:nvPr>
-        </p:nvSpPr>
-        <p:spPr/>
-        <p:txBody>
-          <a:bodyPr/>
-          <a:lstStyle/>
-          <a:p>
-            <a:pPr eaLnBrk="1" fontAlgn="auto" hangingPunct="1">
-              <a:spcAft>
-                <a:spcPts val="0"/>
-              </a:spcAft>
-              <a:defRPr/>
-            </a:pPr>
-            <a:r>
-              <a:rPr lang="en-US" altLang="en-US"/>
-              <a:t>Misc.</a:t>
-            </a:r>
-            <a:endParaRPr lang="en-CA" altLang="en-US"/>
-          </a:p>
-        </p:txBody>
-      </p:sp>
-      <p:sp>
-        <p:nvSpPr>
-          <p:cNvPr id="12291" name="Content Placeholder 2">
-            <a:extLst>
-              <a:ext uri="{FF2B5EF4-FFF2-40B4-BE49-F238E27FC236}">
-                <a16:creationId xmlns:a16="http://schemas.microsoft.com/office/drawing/2014/main" id="{1B6B8269-0938-464C-B74D-83833F314A96}"/>
-              </a:ext>
-            </a:extLst>
-          </p:cNvPr>
-          <p:cNvSpPr>
-            <a:spLocks noGrp="1"/>
-          </p:cNvSpPr>
-          <p:nvPr>
-            <p:ph idx="1"/>
-          </p:nvPr>
-        </p:nvSpPr>
-        <p:spPr/>
-        <p:txBody>
-          <a:bodyPr/>
-          <a:lstStyle/>
-          <a:p>
-            <a:pPr eaLnBrk="1" hangingPunct="1"/>
-            <a:r>
-              <a:rPr lang="en-US" altLang="en-US"/>
-              <a:t>Add other insights if you like but remember, your group’s report-out must be kept within 5 minutes </a:t>
-            </a:r>
-            <a:endParaRPr lang="en-CA" altLang="en-US"/>
-          </a:p>
-        </p:txBody>
-      </p:sp>
-    </p:spTree>
-  </p:cSld>
-  <p:clrMapOvr>
-    <a:masterClrMapping/>
-  </p:clrMapOvr>
-</p:sld>
-</file>
-
-<file path=ppt/slides/slide9.xml><?xml version="1.0" encoding="utf-8"?>
-<p:sld xmlns:a="http://schemas.openxmlformats.org/drawingml/2006/main" xmlns:r="http://schemas.openxmlformats.org/officeDocument/2006/relationships" xmlns:p="http://schemas.openxmlformats.org/presentationml/2006/main">
-  <p:cSld>
-    <p:spTree>
-      <p:nvGrpSpPr>
-        <p:cNvPr id="1" name=""/>
-        <p:cNvGrpSpPr/>
-        <p:nvPr/>
-      </p:nvGrpSpPr>
-      <p:grpSpPr>
-        <a:xfrm>
-          <a:off x="0" y="0"/>
-          <a:ext cx="0" cy="0"/>
-          <a:chOff x="0" y="0"/>
-          <a:chExt cx="0" cy="0"/>
-        </a:xfrm>
-      </p:grpSpPr>
-      <p:sp>
-        <p:nvSpPr>
           <p:cNvPr id="9218" name="Title 1">
             <a:extLst>
               <a:ext uri="{FF2B5EF4-FFF2-40B4-BE49-F238E27FC236}">

</xml_diff>

<commit_message>
Presentation milestone 1 done
</commit_message>
<xml_diff>
--- a/Milestone 1.pptx
+++ b/Milestone 1.pptx
@@ -6430,7 +6430,7 @@
         </p:nvSpPr>
         <p:spPr>
           <a:xfrm>
-            <a:off x="2214563" y="5121275"/>
+            <a:off x="2370011" y="4405906"/>
             <a:ext cx="8045450" cy="742950"/>
           </a:xfrm>
         </p:spPr>
@@ -6447,18 +6447,17 @@
               <a:defRPr/>
             </a:pPr>
             <a:r>
-              <a:rPr lang="en-US" altLang="en-US" sz="900" dirty="0"/>
+              <a:rPr lang="en-US" altLang="en-US" sz="1600" dirty="0"/>
               <a:t>UR </a:t>
             </a:r>
             <a:r>
-              <a:rPr lang="en-US" altLang="en-US" sz="900" dirty="0" err="1"/>
+              <a:rPr lang="en-US" altLang="en-US" sz="1600" dirty="0" err="1"/>
               <a:t>XTech</a:t>
             </a:r>
             <a:r>
-              <a:rPr lang="en-US" altLang="en-US" sz="900" dirty="0"/>
+              <a:rPr lang="en-US" altLang="en-US" sz="1600" dirty="0"/>
               <a:t> </a:t>
             </a:r>
-            <a:endParaRPr lang="en-US" altLang="en-US" sz="900"/>
           </a:p>
           <a:p>
             <a:pPr eaLnBrk="1" fontAlgn="auto" hangingPunct="1">
@@ -6467,7 +6466,7 @@
               </a:spcAft>
               <a:defRPr/>
             </a:pPr>
-            <a:endParaRPr lang="en-US" altLang="en-US" sz="900"/>
+            <a:endParaRPr lang="en-US" altLang="en-US" sz="1600" dirty="0"/>
           </a:p>
           <a:p>
             <a:pPr eaLnBrk="1" fontAlgn="auto" hangingPunct="1">
@@ -6477,14 +6476,14 @@
               <a:defRPr/>
             </a:pPr>
             <a:r>
-              <a:rPr lang="en-US" altLang="en-US" sz="900" dirty="0"/>
+              <a:rPr lang="en-US" altLang="en-US" sz="1600" dirty="0"/>
               <a:t>Kaden </a:t>
             </a:r>
             <a:r>
-              <a:rPr lang="en-US" altLang="en-US" sz="900" dirty="0" err="1"/>
+              <a:rPr lang="en-US" altLang="en-US" sz="1600" dirty="0" err="1"/>
               <a:t>Goski</a:t>
             </a:r>
-            <a:endParaRPr lang="en-US" altLang="en-US" sz="900" dirty="0"/>
+            <a:endParaRPr lang="en-US" altLang="en-US" sz="1600" dirty="0"/>
           </a:p>
           <a:p>
             <a:pPr eaLnBrk="1" fontAlgn="auto" hangingPunct="1">
@@ -6494,7 +6493,7 @@
               <a:defRPr/>
             </a:pPr>
             <a:r>
-              <a:rPr lang="en-US" altLang="en-US" sz="900" dirty="0"/>
+              <a:rPr lang="en-US" altLang="en-US" sz="1600" dirty="0"/>
               <a:t>Julio Andrés Silva Vásquez</a:t>
             </a:r>
           </a:p>
@@ -6506,18 +6505,18 @@
               <a:defRPr/>
             </a:pPr>
             <a:r>
-              <a:rPr lang="es-MX" sz="900" dirty="0" err="1"/>
+              <a:rPr lang="es-MX" sz="1600" dirty="0" err="1"/>
               <a:t>PAul</a:t>
             </a:r>
             <a:r>
-              <a:rPr lang="es-MX" sz="900" dirty="0"/>
+              <a:rPr lang="es-MX" sz="1600" dirty="0"/>
               <a:t> </a:t>
             </a:r>
             <a:r>
-              <a:rPr lang="es-MX" sz="900" dirty="0" err="1"/>
+              <a:rPr lang="es-MX" sz="1600" dirty="0" err="1"/>
               <a:t>Wangwe</a:t>
             </a:r>
-            <a:endParaRPr lang="es-MX" sz="900" dirty="0"/>
+            <a:endParaRPr lang="es-MX" sz="1600" dirty="0"/>
           </a:p>
           <a:p>
             <a:pPr eaLnBrk="1" fontAlgn="auto" hangingPunct="1">
@@ -6527,14 +6526,14 @@
               <a:defRPr/>
             </a:pPr>
             <a:r>
-              <a:rPr lang="es-MX" altLang="en-US" sz="900" dirty="0" err="1"/>
+              <a:rPr lang="es-MX" altLang="en-US" sz="1600" dirty="0" err="1"/>
               <a:t>October</a:t>
             </a:r>
             <a:r>
-              <a:rPr lang="es-MX" altLang="en-US" sz="900" dirty="0"/>
+              <a:rPr lang="es-MX" altLang="en-US" sz="1600" dirty="0"/>
               <a:t> 2nd 2019</a:t>
             </a:r>
-            <a:endParaRPr lang="en-US" altLang="en-US" sz="900" dirty="0"/>
+            <a:endParaRPr lang="en-US" altLang="en-US" sz="1600" dirty="0"/>
           </a:p>
         </p:txBody>
       </p:sp>
@@ -6543,6 +6542,13 @@
   <p:clrMapOvr>
     <a:masterClrMapping/>
   </p:clrMapOvr>
+  <p:timing>
+    <p:tnLst>
+      <p:par>
+        <p:cTn id="1" dur="indefinite" restart="never" nodeType="tmRoot"/>
+      </p:par>
+    </p:tnLst>
+  </p:timing>
 </p:sld>
 </file>
 
@@ -6671,7 +6677,7 @@
         </p:blipFill>
         <p:spPr bwMode="auto">
           <a:xfrm>
-            <a:off x="6567488" y="1595438"/>
+            <a:off x="6832664" y="1596231"/>
             <a:ext cx="5114925" cy="4481512"/>
           </a:xfrm>
           <a:prstGeom prst="rect">
@@ -6707,6 +6713,13 @@
   <p:clrMapOvr>
     <a:masterClrMapping/>
   </p:clrMapOvr>
+  <p:timing>
+    <p:tnLst>
+      <p:par>
+        <p:cTn id="1" dur="indefinite" restart="never" nodeType="tmRoot"/>
+      </p:par>
+    </p:tnLst>
+  </p:timing>
 </p:sld>
 </file>
 
@@ -6900,6 +6913,13 @@
   <p:clrMapOvr>
     <a:masterClrMapping/>
   </p:clrMapOvr>
+  <p:timing>
+    <p:tnLst>
+      <p:par>
+        <p:cTn id="1" dur="indefinite" restart="never" nodeType="tmRoot"/>
+      </p:par>
+    </p:tnLst>
+  </p:timing>
 </p:sld>
 </file>
 
@@ -7258,6 +7278,13 @@
   <p:clrMapOvr>
     <a:masterClrMapping/>
   </p:clrMapOvr>
+  <p:timing>
+    <p:tnLst>
+      <p:par>
+        <p:cTn id="1" dur="indefinite" restart="never" nodeType="tmRoot"/>
+      </p:par>
+    </p:tnLst>
+  </p:timing>
 </p:sld>
 </file>
 
@@ -7300,13 +7327,14 @@
           <a:lstStyle/>
           <a:p>
             <a:r>
-              <a:rPr lang="en-US"/>
+              <a:rPr lang="en-US" dirty="0"/>
               <a:t>Functional </a:t>
             </a:r>
             <a:r>
-              <a:rPr lang="en-US" err="1"/>
-              <a:t>ReQuirements</a:t>
-            </a:r>
+              <a:rPr lang="en-US" dirty="0" smtClean="0"/>
+              <a:t>Requirements</a:t>
+            </a:r>
+            <a:endParaRPr lang="en-US" dirty="0"/>
           </a:p>
         </p:txBody>
       </p:sp>
@@ -7332,27 +7360,38 @@
           <a:lstStyle/>
           <a:p>
             <a:r>
-              <a:rPr lang="en-US"/>
+              <a:rPr lang="en-US" dirty="0"/>
               <a:t>Allow the user to watch trailers of movies</a:t>
             </a:r>
           </a:p>
           <a:p>
             <a:r>
-              <a:rPr lang="en-US"/>
+              <a:rPr lang="en-US" dirty="0"/>
               <a:t>Allow the user to sign in and post reviews</a:t>
             </a:r>
           </a:p>
           <a:p>
             <a:r>
-              <a:rPr lang="en-US"/>
+              <a:rPr lang="en-US" dirty="0"/>
               <a:t>Recommend movies based on the user preferences</a:t>
             </a:r>
           </a:p>
           <a:p>
             <a:r>
-              <a:rPr lang="en-US"/>
-              <a:t>Provide the user with information about screening times and where they will be screened</a:t>
-            </a:r>
+              <a:rPr lang="en-US" dirty="0"/>
+              <a:t>Provide the user with information about screening times and where they will be </a:t>
+            </a:r>
+            <a:r>
+              <a:rPr lang="en-US" dirty="0" smtClean="0"/>
+              <a:t>screened</a:t>
+            </a:r>
+          </a:p>
+          <a:p>
+            <a:r>
+              <a:rPr lang="en-US" dirty="0" smtClean="0"/>
+              <a:t>Reward system to best rated reviews.</a:t>
+            </a:r>
+            <a:endParaRPr lang="en-US" dirty="0"/>
           </a:p>
         </p:txBody>
       </p:sp>
@@ -7366,6 +7405,13 @@
   <p:clrMapOvr>
     <a:masterClrMapping/>
   </p:clrMapOvr>
+  <p:timing>
+    <p:tnLst>
+      <p:par>
+        <p:cTn id="1" dur="indefinite" restart="never" nodeType="tmRoot"/>
+      </p:par>
+    </p:tnLst>
+  </p:timing>
 </p:sld>
 </file>
 
@@ -7421,71 +7467,48 @@
           </a:p>
         </p:txBody>
       </p:sp>
-      <p:pic>
-        <p:nvPicPr>
-          <p:cNvPr id="10243" name="Picture 1">
-            <a:extLst>
-              <a:ext uri="{FF2B5EF4-FFF2-40B4-BE49-F238E27FC236}">
-                <a16:creationId xmlns:a16="http://schemas.microsoft.com/office/drawing/2014/main" id="{A2EA348E-8FD7-42E3-ACFD-11A33AD0A492}"/>
-              </a:ext>
-            </a:extLst>
+      <p:sp>
+        <p:nvSpPr>
+          <p:cNvPr id="2" name="Rectangle 1">
+            <a:hlinkClick r:id="rId2"/>
           </p:cNvPr>
-          <p:cNvPicPr>
-            <a:picLocks noChangeAspect="1"/>
-          </p:cNvPicPr>
+          <p:cNvSpPr/>
           <p:nvPr/>
-        </p:nvPicPr>
-        <p:blipFill>
-          <a:blip r:embed="rId2">
-            <a:extLst>
-              <a:ext uri="{28A0092B-C50C-407E-A947-70E740481C1C}">
-                <a14:useLocalDpi xmlns:a14="http://schemas.microsoft.com/office/drawing/2010/main" val="0"/>
-              </a:ext>
-            </a:extLst>
-          </a:blip>
-          <a:srcRect t="12733"/>
-          <a:stretch>
-            <a:fillRect/>
-          </a:stretch>
-        </p:blipFill>
-        <p:spPr bwMode="auto">
+        </p:nvSpPr>
+        <p:spPr>
           <a:xfrm>
-            <a:off x="1398588" y="1219200"/>
-            <a:ext cx="9864725" cy="5499100"/>
+            <a:off x="890016" y="2877235"/>
+            <a:ext cx="10814304" cy="369332"/>
           </a:xfrm>
           <a:prstGeom prst="rect">
             <a:avLst/>
           </a:prstGeom>
-          <a:noFill/>
-          <a:ln>
-            <a:noFill/>
-          </a:ln>
-          <a:extLst>
-            <a:ext uri="{909E8E84-426E-40DD-AFC4-6F175D3DCCD1}">
-              <a14:hiddenFill xmlns:a14="http://schemas.microsoft.com/office/drawing/2010/main">
-                <a:solidFill>
-                  <a:srgbClr val="FFFFFF"/>
-                </a:solidFill>
-              </a14:hiddenFill>
-            </a:ext>
-            <a:ext uri="{91240B29-F687-4F45-9708-019B960494DF}">
-              <a14:hiddenLine xmlns:a14="http://schemas.microsoft.com/office/drawing/2010/main" w="9525">
-                <a:solidFill>
-                  <a:srgbClr val="000000"/>
-                </a:solidFill>
-                <a:miter lim="800000"/>
-                <a:headEnd/>
-                <a:tailEnd/>
-              </a14:hiddenLine>
-            </a:ext>
-          </a:extLst>
         </p:spPr>
-      </p:pic>
+        <p:txBody>
+          <a:bodyPr wrap="square">
+            <a:spAutoFit/>
+          </a:bodyPr>
+          <a:lstStyle/>
+          <a:p>
+            <a:r>
+              <a:rPr lang="es-MX" dirty="0"/>
+              <a:t>https://github.com/alpacamusical/Project-ENSE-374/projects/1?fullscreen=true</a:t>
+            </a:r>
+          </a:p>
+        </p:txBody>
+      </p:sp>
     </p:spTree>
   </p:cSld>
   <p:clrMapOvr>
     <a:masterClrMapping/>
   </p:clrMapOvr>
+  <p:timing>
+    <p:tnLst>
+      <p:par>
+        <p:cTn id="1" dur="indefinite" restart="never" nodeType="tmRoot"/>
+      </p:par>
+    </p:tnLst>
+  </p:timing>
 </p:sld>
 </file>
 
@@ -7607,6 +7630,13 @@
   <p:clrMapOvr>
     <a:masterClrMapping/>
   </p:clrMapOvr>
+  <p:timing>
+    <p:tnLst>
+      <p:par>
+        <p:cTn id="1" dur="indefinite" restart="never" nodeType="tmRoot"/>
+      </p:par>
+    </p:tnLst>
+  </p:timing>
 </p:sld>
 </file>
 
@@ -7771,6 +7801,13 @@
   <p:clrMapOvr>
     <a:masterClrMapping/>
   </p:clrMapOvr>
+  <p:timing>
+    <p:tnLst>
+      <p:par>
+        <p:cTn id="1" dur="indefinite" restart="never" nodeType="tmRoot"/>
+      </p:par>
+    </p:tnLst>
+  </p:timing>
 </p:sld>
 </file>
 

</xml_diff>